<commit_message>
updated 3 figures to fit nature genetics guidelines
</commit_message>
<xml_diff>
--- a/notes/method_combined.pptx
+++ b/notes/method_combined.pptx
@@ -193,7 +193,7 @@
           <a:p>
             <a:fld id="{8697676B-D6F9-434B-868D-63EBE58084CF}" type="datetimeFigureOut">
               <a:rPr lang="en-US" smtClean="0"/>
-              <a:t>20/10/20</a:t>
+              <a:t>20/10/22</a:t>
             </a:fld>
             <a:endParaRPr lang="en-US"/>
           </a:p>
@@ -726,7 +726,7 @@
           <a:p>
             <a:fld id="{E7EFD90C-36BD-A547-9E35-1F67BA9850CE}" type="datetimeFigureOut">
               <a:rPr lang="en-US" smtClean="0"/>
-              <a:t>20/10/20</a:t>
+              <a:t>20/10/22</a:t>
             </a:fld>
             <a:endParaRPr lang="en-US"/>
           </a:p>
@@ -896,7 +896,7 @@
           <a:p>
             <a:fld id="{E7EFD90C-36BD-A547-9E35-1F67BA9850CE}" type="datetimeFigureOut">
               <a:rPr lang="en-US" smtClean="0"/>
-              <a:t>20/10/20</a:t>
+              <a:t>20/10/22</a:t>
             </a:fld>
             <a:endParaRPr lang="en-US"/>
           </a:p>
@@ -1076,7 +1076,7 @@
           <a:p>
             <a:fld id="{E7EFD90C-36BD-A547-9E35-1F67BA9850CE}" type="datetimeFigureOut">
               <a:rPr lang="en-US" smtClean="0"/>
-              <a:t>20/10/20</a:t>
+              <a:t>20/10/22</a:t>
             </a:fld>
             <a:endParaRPr lang="en-US"/>
           </a:p>
@@ -1246,7 +1246,7 @@
           <a:p>
             <a:fld id="{E7EFD90C-36BD-A547-9E35-1F67BA9850CE}" type="datetimeFigureOut">
               <a:rPr lang="en-US" smtClean="0"/>
-              <a:t>20/10/20</a:t>
+              <a:t>20/10/22</a:t>
             </a:fld>
             <a:endParaRPr lang="en-US"/>
           </a:p>
@@ -1492,7 +1492,7 @@
           <a:p>
             <a:fld id="{E7EFD90C-36BD-A547-9E35-1F67BA9850CE}" type="datetimeFigureOut">
               <a:rPr lang="en-US" smtClean="0"/>
-              <a:t>20/10/20</a:t>
+              <a:t>20/10/22</a:t>
             </a:fld>
             <a:endParaRPr lang="en-US"/>
           </a:p>
@@ -1780,7 +1780,7 @@
           <a:p>
             <a:fld id="{E7EFD90C-36BD-A547-9E35-1F67BA9850CE}" type="datetimeFigureOut">
               <a:rPr lang="en-US" smtClean="0"/>
-              <a:t>20/10/20</a:t>
+              <a:t>20/10/22</a:t>
             </a:fld>
             <a:endParaRPr lang="en-US"/>
           </a:p>
@@ -2202,7 +2202,7 @@
           <a:p>
             <a:fld id="{E7EFD90C-36BD-A547-9E35-1F67BA9850CE}" type="datetimeFigureOut">
               <a:rPr lang="en-US" smtClean="0"/>
-              <a:t>20/10/20</a:t>
+              <a:t>20/10/22</a:t>
             </a:fld>
             <a:endParaRPr lang="en-US"/>
           </a:p>
@@ -2320,7 +2320,7 @@
           <a:p>
             <a:fld id="{E7EFD90C-36BD-A547-9E35-1F67BA9850CE}" type="datetimeFigureOut">
               <a:rPr lang="en-US" smtClean="0"/>
-              <a:t>20/10/20</a:t>
+              <a:t>20/10/22</a:t>
             </a:fld>
             <a:endParaRPr lang="en-US"/>
           </a:p>
@@ -2415,7 +2415,7 @@
           <a:p>
             <a:fld id="{E7EFD90C-36BD-A547-9E35-1F67BA9850CE}" type="datetimeFigureOut">
               <a:rPr lang="en-US" smtClean="0"/>
-              <a:t>20/10/20</a:t>
+              <a:t>20/10/22</a:t>
             </a:fld>
             <a:endParaRPr lang="en-US"/>
           </a:p>
@@ -2692,7 +2692,7 @@
           <a:p>
             <a:fld id="{E7EFD90C-36BD-A547-9E35-1F67BA9850CE}" type="datetimeFigureOut">
               <a:rPr lang="en-US" smtClean="0"/>
-              <a:t>20/10/20</a:t>
+              <a:t>20/10/22</a:t>
             </a:fld>
             <a:endParaRPr lang="en-US"/>
           </a:p>
@@ -2945,7 +2945,7 @@
           <a:p>
             <a:fld id="{E7EFD90C-36BD-A547-9E35-1F67BA9850CE}" type="datetimeFigureOut">
               <a:rPr lang="en-US" smtClean="0"/>
-              <a:t>20/10/20</a:t>
+              <a:t>20/10/22</a:t>
             </a:fld>
             <a:endParaRPr lang="en-US"/>
           </a:p>
@@ -3158,7 +3158,7 @@
           <a:p>
             <a:fld id="{E7EFD90C-36BD-A547-9E35-1F67BA9850CE}" type="datetimeFigureOut">
               <a:rPr lang="en-US" smtClean="0"/>
-              <a:t>20/10/20</a:t>
+              <a:t>20/10/22</a:t>
             </a:fld>
             <a:endParaRPr lang="en-US"/>
           </a:p>
@@ -3560,14 +3560,7 @@
                 <a:latin typeface="Arial"/>
                 <a:cs typeface="Arial"/>
               </a:rPr>
-              <a:t>A. </a:t>
-            </a:r>
-            <a:r>
-              <a:rPr lang="en-US" sz="2400" b="1" dirty="0">
-                <a:latin typeface="Arial"/>
-                <a:cs typeface="Arial"/>
-              </a:rPr>
-              <a:t>Examine </a:t>
+              <a:t>a  Examine </a:t>
             </a:r>
             <a:r>
               <a:rPr lang="en-US" sz="2400" b="1" dirty="0" smtClean="0">
@@ -10142,11 +10135,32 @@
           <a:lstStyle/>
           <a:p>
             <a:r>
+              <a:rPr lang="en-US" sz="2400" b="1" dirty="0">
+                <a:latin typeface="Arial"/>
+                <a:cs typeface="Arial"/>
+              </a:rPr>
+              <a:t>b</a:t>
+            </a:r>
+            <a:r>
               <a:rPr lang="en-US" sz="2400" b="1" dirty="0" smtClean="0">
                 <a:latin typeface="Arial"/>
                 <a:cs typeface="Arial"/>
               </a:rPr>
-              <a:t>B. Find </a:t>
+              <a:t> </a:t>
+            </a:r>
+            <a:r>
+              <a:rPr lang="en-US" sz="2400" b="1" dirty="0" smtClean="0">
+                <a:latin typeface="Arial"/>
+                <a:cs typeface="Arial"/>
+              </a:rPr>
+              <a:t> </a:t>
+            </a:r>
+            <a:r>
+              <a:rPr lang="en-US" sz="2400" b="1" dirty="0" smtClean="0">
+                <a:latin typeface="Arial"/>
+                <a:cs typeface="Arial"/>
+              </a:rPr>
+              <a:t>Find </a:t>
             </a:r>
             <a:r>
               <a:rPr lang="en-US" sz="2400" b="1" dirty="0">
@@ -10815,8 +10829,8 @@
         </p:blipFill>
         <p:spPr>
           <a:xfrm>
-            <a:off x="3359453" y="7334234"/>
-            <a:ext cx="1113704" cy="270470"/>
+            <a:off x="3303768" y="7320711"/>
+            <a:ext cx="1225074" cy="297517"/>
           </a:xfrm>
           <a:prstGeom prst="rect">
             <a:avLst/>
@@ -10845,8 +10859,8 @@
         </p:blipFill>
         <p:spPr>
           <a:xfrm>
-            <a:off x="1480024" y="6725279"/>
-            <a:ext cx="1181512" cy="286940"/>
+            <a:off x="1433064" y="6688370"/>
+            <a:ext cx="1251907" cy="304036"/>
           </a:xfrm>
           <a:prstGeom prst="rect">
             <a:avLst/>
@@ -10875,8 +10889,8 @@
         </p:blipFill>
         <p:spPr>
           <a:xfrm>
-            <a:off x="3375736" y="6721112"/>
-            <a:ext cx="1113704" cy="270470"/>
+            <a:off x="3320051" y="6707589"/>
+            <a:ext cx="1225074" cy="297517"/>
           </a:xfrm>
           <a:prstGeom prst="rect">
             <a:avLst/>
@@ -10905,8 +10919,8 @@
         </p:blipFill>
         <p:spPr>
           <a:xfrm>
-            <a:off x="1480026" y="7318498"/>
-            <a:ext cx="1113704" cy="274391"/>
+            <a:off x="1424341" y="7304778"/>
+            <a:ext cx="1225074" cy="301830"/>
           </a:xfrm>
           <a:prstGeom prst="rect">
             <a:avLst/>
@@ -10921,7 +10935,7 @@
         </p:nvSpPr>
         <p:spPr>
           <a:xfrm>
-            <a:off x="785863" y="7932558"/>
+            <a:off x="836663" y="7932558"/>
             <a:ext cx="5286411" cy="369324"/>
           </a:xfrm>
           <a:prstGeom prst="rect">
@@ -11798,7 +11812,7 @@
         </p:blipFill>
         <p:spPr>
           <a:xfrm>
-            <a:off x="1469378" y="8520566"/>
+            <a:off x="1469378" y="8495166"/>
             <a:ext cx="1192158" cy="285081"/>
           </a:xfrm>
           <a:prstGeom prst="rect">
@@ -11836,66 +11850,6 @@
           </a:prstGeom>
         </p:spPr>
       </p:pic>
-      <p:pic>
-        <p:nvPicPr>
-          <p:cNvPr id="70" name="Picture 69" descr="h_1,_h_2,_pmb_h_.pdf"/>
-          <p:cNvPicPr>
-            <a:picLocks noChangeAspect="1"/>
-          </p:cNvPicPr>
-          <p:nvPr/>
-        </p:nvPicPr>
-        <p:blipFill>
-          <a:blip r:embed="rId19">
-            <a:extLst>
-              <a:ext uri="{28A0092B-C50C-407E-A947-70E740481C1C}">
-                <a14:useLocalDpi xmlns:a14="http://schemas.microsoft.com/office/drawing/2010/main" val="0"/>
-              </a:ext>
-            </a:extLst>
-          </a:blip>
-          <a:stretch>
-            <a:fillRect/>
-          </a:stretch>
-        </p:blipFill>
-        <p:spPr>
-          <a:xfrm>
-            <a:off x="3368560" y="8480016"/>
-            <a:ext cx="1186426" cy="292308"/>
-          </a:xfrm>
-          <a:prstGeom prst="rect">
-            <a:avLst/>
-          </a:prstGeom>
-        </p:spPr>
-      </p:pic>
-      <p:pic>
-        <p:nvPicPr>
-          <p:cNvPr id="71" name="Picture 70" descr="h_4,_h_5,_pmb_h_.pdf"/>
-          <p:cNvPicPr>
-            <a:picLocks noChangeAspect="1"/>
-          </p:cNvPicPr>
-          <p:nvPr/>
-        </p:nvPicPr>
-        <p:blipFill>
-          <a:blip r:embed="rId20">
-            <a:extLst>
-              <a:ext uri="{28A0092B-C50C-407E-A947-70E740481C1C}">
-                <a14:useLocalDpi xmlns:a14="http://schemas.microsoft.com/office/drawing/2010/main" val="0"/>
-              </a:ext>
-            </a:extLst>
-          </a:blip>
-          <a:stretch>
-            <a:fillRect/>
-          </a:stretch>
-        </p:blipFill>
-        <p:spPr>
-          <a:xfrm>
-            <a:off x="1443366" y="9100731"/>
-            <a:ext cx="1279600" cy="315263"/>
-          </a:xfrm>
-          <a:prstGeom prst="rect">
-            <a:avLst/>
-          </a:prstGeom>
-        </p:spPr>
-      </p:pic>
       <p:sp>
         <p:nvSpPr>
           <p:cNvPr id="72" name="TextBox 71"/>
@@ -11904,8 +11858,8 @@
         </p:nvSpPr>
         <p:spPr>
           <a:xfrm>
-            <a:off x="731153" y="5405176"/>
-            <a:ext cx="5469003" cy="461657"/>
+            <a:off x="781953" y="5405176"/>
+            <a:ext cx="5417908" cy="461657"/>
           </a:xfrm>
           <a:prstGeom prst="rect">
             <a:avLst/>
@@ -11919,11 +11873,25 @@
           <a:lstStyle/>
           <a:p>
             <a:r>
+              <a:rPr lang="en-US" sz="2400" b="1" dirty="0">
+                <a:latin typeface="Arial"/>
+                <a:cs typeface="Arial"/>
+              </a:rPr>
+              <a:t>c</a:t>
+            </a:r>
+            <a:r>
               <a:rPr lang="en-US" sz="2400" b="1" dirty="0" smtClean="0">
                 <a:latin typeface="Arial"/>
                 <a:cs typeface="Arial"/>
               </a:rPr>
-              <a:t>C. Connect </a:t>
+              <a:t>  </a:t>
+            </a:r>
+            <a:r>
+              <a:rPr lang="en-US" sz="2400" b="1" dirty="0" smtClean="0">
+                <a:latin typeface="Arial"/>
+                <a:cs typeface="Arial"/>
+              </a:rPr>
+              <a:t>Connect </a:t>
             </a:r>
             <a:r>
               <a:rPr lang="en-US" sz="2400" b="1" dirty="0">
@@ -11943,7 +11911,7 @@
         </p:nvSpPr>
         <p:spPr>
           <a:xfrm>
-            <a:off x="805642" y="6064321"/>
+            <a:off x="856442" y="6064321"/>
             <a:ext cx="5172235" cy="369324"/>
           </a:xfrm>
           <a:prstGeom prst="rect">
@@ -12995,7 +12963,7 @@
           <p:nvPr/>
         </p:nvPicPr>
         <p:blipFill>
-          <a:blip r:embed="rId21">
+          <a:blip r:embed="rId19">
             <a:extLst>
               <a:ext uri="{28A0092B-C50C-407E-A947-70E740481C1C}">
                 <a14:useLocalDpi xmlns:a14="http://schemas.microsoft.com/office/drawing/2010/main" val="0"/>
@@ -13025,7 +12993,7 @@
           <p:nvPr/>
         </p:nvPicPr>
         <p:blipFill>
-          <a:blip r:embed="rId22">
+          <a:blip r:embed="rId20">
             <a:extLst>
               <a:ext uri="{28A0092B-C50C-407E-A947-70E740481C1C}">
                 <a14:useLocalDpi xmlns:a14="http://schemas.microsoft.com/office/drawing/2010/main" val="0"/>
@@ -13598,7 +13566,7 @@
           <p:nvPr/>
         </p:nvPicPr>
         <p:blipFill>
-          <a:blip r:embed="rId23">
+          <a:blip r:embed="rId21">
             <a:extLst>
               <a:ext uri="{28A0092B-C50C-407E-A947-70E740481C1C}">
                 <a14:useLocalDpi xmlns:a14="http://schemas.microsoft.com/office/drawing/2010/main" val="0"/>
@@ -13628,14 +13596,14 @@
           <p:nvPr/>
         </p:nvPicPr>
         <p:blipFill>
-          <a:blip r:embed="rId24"/>
+          <a:blip r:embed="rId22"/>
           <a:stretch>
             <a:fillRect/>
           </a:stretch>
         </p:blipFill>
         <p:spPr>
           <a:xfrm>
-            <a:off x="9733235" y="8500692"/>
+            <a:off x="9720535" y="8500692"/>
             <a:ext cx="299109" cy="299109"/>
           </a:xfrm>
           <a:prstGeom prst="rect">
@@ -13652,7 +13620,7 @@
           <p:nvPr/>
         </p:nvPicPr>
         <p:blipFill>
-          <a:blip r:embed="rId24"/>
+          <a:blip r:embed="rId22"/>
           <a:stretch>
             <a:fillRect/>
           </a:stretch>
@@ -13676,7 +13644,7 @@
           <p:nvPr/>
         </p:nvPicPr>
         <p:blipFill>
-          <a:blip r:embed="rId25">
+          <a:blip r:embed="rId23">
             <a:extLst>
               <a:ext uri="{28A0092B-C50C-407E-A947-70E740481C1C}">
                 <a14:useLocalDpi xmlns:a14="http://schemas.microsoft.com/office/drawing/2010/main" val="0"/>
@@ -13706,7 +13674,7 @@
           <p:nvPr/>
         </p:nvPicPr>
         <p:blipFill>
-          <a:blip r:embed="rId26"/>
+          <a:blip r:embed="rId24"/>
           <a:stretch>
             <a:fillRect/>
           </a:stretch>
@@ -13730,7 +13698,7 @@
           <p:nvPr/>
         </p:nvPicPr>
         <p:blipFill>
-          <a:blip r:embed="rId26"/>
+          <a:blip r:embed="rId24"/>
           <a:stretch>
             <a:fillRect/>
           </a:stretch>
@@ -13754,7 +13722,7 @@
           <p:nvPr/>
         </p:nvPicPr>
         <p:blipFill>
-          <a:blip r:embed="rId26"/>
+          <a:blip r:embed="rId24"/>
           <a:stretch>
             <a:fillRect/>
           </a:stretch>
@@ -13979,11 +13947,25 @@
           <a:lstStyle/>
           <a:p>
             <a:r>
+              <a:rPr lang="en-US" sz="2400" b="1" dirty="0">
+                <a:latin typeface="Arial"/>
+                <a:cs typeface="Arial"/>
+              </a:rPr>
+              <a:t>d</a:t>
+            </a:r>
+            <a:r>
               <a:rPr lang="en-US" sz="2400" b="1" dirty="0" smtClean="0">
                 <a:latin typeface="Arial"/>
                 <a:cs typeface="Arial"/>
               </a:rPr>
-              <a:t>D. Stitch </a:t>
+              <a:t>  </a:t>
+            </a:r>
+            <a:r>
+              <a:rPr lang="en-US" sz="2400" b="1" dirty="0" smtClean="0">
+                <a:latin typeface="Arial"/>
+                <a:cs typeface="Arial"/>
+              </a:rPr>
+              <a:t>Stitch </a:t>
             </a:r>
             <a:r>
               <a:rPr lang="en-US" sz="2400" b="1" dirty="0">
@@ -14015,7 +13997,7 @@
           <p:nvPr/>
         </p:nvPicPr>
         <p:blipFill>
-          <a:blip r:embed="rId27">
+          <a:blip r:embed="rId25">
             <a:extLst>
               <a:ext uri="{28A0092B-C50C-407E-A947-70E740481C1C}">
                 <a14:useLocalDpi xmlns:a14="http://schemas.microsoft.com/office/drawing/2010/main" val="0"/>
@@ -14045,7 +14027,7 @@
           <p:nvPr/>
         </p:nvPicPr>
         <p:blipFill>
-          <a:blip r:embed="rId28"/>
+          <a:blip r:embed="rId26"/>
           <a:stretch>
             <a:fillRect/>
           </a:stretch>
@@ -14520,7 +14502,7 @@
           <p:nvPr/>
         </p:nvPicPr>
         <p:blipFill>
-          <a:blip r:embed="rId29">
+          <a:blip r:embed="rId27">
             <a:extLst>
               <a:ext uri="{28A0092B-C50C-407E-A947-70E740481C1C}">
                 <a14:useLocalDpi xmlns:a14="http://schemas.microsoft.com/office/drawing/2010/main" val="0"/>
@@ -14533,8 +14515,8 @@
         </p:blipFill>
         <p:spPr>
           <a:xfrm>
-            <a:off x="12550571" y="7257238"/>
-            <a:ext cx="811045" cy="314876"/>
+            <a:off x="12587436" y="7271551"/>
+            <a:ext cx="737314" cy="286251"/>
           </a:xfrm>
           <a:prstGeom prst="rect">
             <a:avLst/>
@@ -14550,7 +14532,7 @@
           <p:nvPr/>
         </p:nvPicPr>
         <p:blipFill>
-          <a:blip r:embed="rId30">
+          <a:blip r:embed="rId28">
             <a:extLst>
               <a:ext uri="{28A0092B-C50C-407E-A947-70E740481C1C}">
                 <a14:useLocalDpi xmlns:a14="http://schemas.microsoft.com/office/drawing/2010/main" val="0"/>
@@ -14580,7 +14562,7 @@
           <p:nvPr/>
         </p:nvPicPr>
         <p:blipFill>
-          <a:blip r:embed="rId31">
+          <a:blip r:embed="rId29">
             <a:extLst>
               <a:ext uri="{28A0092B-C50C-407E-A947-70E740481C1C}">
                 <a14:useLocalDpi xmlns:a14="http://schemas.microsoft.com/office/drawing/2010/main" val="0"/>
@@ -14595,6 +14577,66 @@
           <a:xfrm>
             <a:off x="10761405" y="3786144"/>
             <a:ext cx="2983945" cy="670467"/>
+          </a:xfrm>
+          <a:prstGeom prst="rect">
+            <a:avLst/>
+          </a:prstGeom>
+        </p:spPr>
+      </p:pic>
+      <p:pic>
+        <p:nvPicPr>
+          <p:cNvPr id="25" name="Picture 24" descr="h_4,_h_5,_boldsy.pdf"/>
+          <p:cNvPicPr>
+            <a:picLocks noChangeAspect="1"/>
+          </p:cNvPicPr>
+          <p:nvPr/>
+        </p:nvPicPr>
+        <p:blipFill>
+          <a:blip r:embed="rId30">
+            <a:extLst>
+              <a:ext uri="{28A0092B-C50C-407E-A947-70E740481C1C}">
+                <a14:useLocalDpi xmlns:a14="http://schemas.microsoft.com/office/drawing/2010/main" val="0"/>
+              </a:ext>
+            </a:extLst>
+          </a:blip>
+          <a:stretch>
+            <a:fillRect/>
+          </a:stretch>
+        </p:blipFill>
+        <p:spPr>
+          <a:xfrm>
+            <a:off x="1433065" y="9136242"/>
+            <a:ext cx="1250620" cy="288605"/>
+          </a:xfrm>
+          <a:prstGeom prst="rect">
+            <a:avLst/>
+          </a:prstGeom>
+        </p:spPr>
+      </p:pic>
+      <p:pic>
+        <p:nvPicPr>
+          <p:cNvPr id="26" name="Picture 25" descr="h_1,_h_2,_boldsy.pdf"/>
+          <p:cNvPicPr>
+            <a:picLocks noChangeAspect="1"/>
+          </p:cNvPicPr>
+          <p:nvPr/>
+        </p:nvPicPr>
+        <p:blipFill>
+          <a:blip r:embed="rId31">
+            <a:extLst>
+              <a:ext uri="{28A0092B-C50C-407E-A947-70E740481C1C}">
+                <a14:useLocalDpi xmlns:a14="http://schemas.microsoft.com/office/drawing/2010/main" val="0"/>
+              </a:ext>
+            </a:extLst>
+          </a:blip>
+          <a:stretch>
+            <a:fillRect/>
+          </a:stretch>
+        </p:blipFill>
+        <p:spPr>
+          <a:xfrm>
+            <a:off x="3329490" y="8480175"/>
+            <a:ext cx="1240421" cy="286251"/>
           </a:xfrm>
           <a:prstGeom prst="rect">
             <a:avLst/>

</xml_diff>

<commit_message>
fix Figure 1 error (thanks to @esobel)
</commit_message>
<xml_diff>
--- a/notes/method_combined.pptx
+++ b/notes/method_combined.pptx
@@ -193,7 +193,7 @@
           <a:p>
             <a:fld id="{8697676B-D6F9-434B-868D-63EBE58084CF}" type="datetimeFigureOut">
               <a:rPr lang="en-US" smtClean="0"/>
-              <a:t>21/2/11</a:t>
+              <a:t>21/6/26</a:t>
             </a:fld>
             <a:endParaRPr lang="en-US"/>
           </a:p>
@@ -726,7 +726,7 @@
           <a:p>
             <a:fld id="{E7EFD90C-36BD-A547-9E35-1F67BA9850CE}" type="datetimeFigureOut">
               <a:rPr lang="en-US" smtClean="0"/>
-              <a:t>21/2/11</a:t>
+              <a:t>21/6/26</a:t>
             </a:fld>
             <a:endParaRPr lang="en-US"/>
           </a:p>
@@ -896,7 +896,7 @@
           <a:p>
             <a:fld id="{E7EFD90C-36BD-A547-9E35-1F67BA9850CE}" type="datetimeFigureOut">
               <a:rPr lang="en-US" smtClean="0"/>
-              <a:t>21/2/11</a:t>
+              <a:t>21/6/26</a:t>
             </a:fld>
             <a:endParaRPr lang="en-US"/>
           </a:p>
@@ -1076,7 +1076,7 @@
           <a:p>
             <a:fld id="{E7EFD90C-36BD-A547-9E35-1F67BA9850CE}" type="datetimeFigureOut">
               <a:rPr lang="en-US" smtClean="0"/>
-              <a:t>21/2/11</a:t>
+              <a:t>21/6/26</a:t>
             </a:fld>
             <a:endParaRPr lang="en-US"/>
           </a:p>
@@ -1246,7 +1246,7 @@
           <a:p>
             <a:fld id="{E7EFD90C-36BD-A547-9E35-1F67BA9850CE}" type="datetimeFigureOut">
               <a:rPr lang="en-US" smtClean="0"/>
-              <a:t>21/2/11</a:t>
+              <a:t>21/6/26</a:t>
             </a:fld>
             <a:endParaRPr lang="en-US"/>
           </a:p>
@@ -1492,7 +1492,7 @@
           <a:p>
             <a:fld id="{E7EFD90C-36BD-A547-9E35-1F67BA9850CE}" type="datetimeFigureOut">
               <a:rPr lang="en-US" smtClean="0"/>
-              <a:t>21/2/11</a:t>
+              <a:t>21/6/26</a:t>
             </a:fld>
             <a:endParaRPr lang="en-US"/>
           </a:p>
@@ -1780,7 +1780,7 @@
           <a:p>
             <a:fld id="{E7EFD90C-36BD-A547-9E35-1F67BA9850CE}" type="datetimeFigureOut">
               <a:rPr lang="en-US" smtClean="0"/>
-              <a:t>21/2/11</a:t>
+              <a:t>21/6/26</a:t>
             </a:fld>
             <a:endParaRPr lang="en-US"/>
           </a:p>
@@ -2202,7 +2202,7 @@
           <a:p>
             <a:fld id="{E7EFD90C-36BD-A547-9E35-1F67BA9850CE}" type="datetimeFigureOut">
               <a:rPr lang="en-US" smtClean="0"/>
-              <a:t>21/2/11</a:t>
+              <a:t>21/6/26</a:t>
             </a:fld>
             <a:endParaRPr lang="en-US"/>
           </a:p>
@@ -2320,7 +2320,7 @@
           <a:p>
             <a:fld id="{E7EFD90C-36BD-A547-9E35-1F67BA9850CE}" type="datetimeFigureOut">
               <a:rPr lang="en-US" smtClean="0"/>
-              <a:t>21/2/11</a:t>
+              <a:t>21/6/26</a:t>
             </a:fld>
             <a:endParaRPr lang="en-US"/>
           </a:p>
@@ -2415,7 +2415,7 @@
           <a:p>
             <a:fld id="{E7EFD90C-36BD-A547-9E35-1F67BA9850CE}" type="datetimeFigureOut">
               <a:rPr lang="en-US" smtClean="0"/>
-              <a:t>21/2/11</a:t>
+              <a:t>21/6/26</a:t>
             </a:fld>
             <a:endParaRPr lang="en-US"/>
           </a:p>
@@ -2692,7 +2692,7 @@
           <a:p>
             <a:fld id="{E7EFD90C-36BD-A547-9E35-1F67BA9850CE}" type="datetimeFigureOut">
               <a:rPr lang="en-US" smtClean="0"/>
-              <a:t>21/2/11</a:t>
+              <a:t>21/6/26</a:t>
             </a:fld>
             <a:endParaRPr lang="en-US"/>
           </a:p>
@@ -2945,7 +2945,7 @@
           <a:p>
             <a:fld id="{E7EFD90C-36BD-A547-9E35-1F67BA9850CE}" type="datetimeFigureOut">
               <a:rPr lang="en-US" smtClean="0"/>
-              <a:t>21/2/11</a:t>
+              <a:t>21/6/26</a:t>
             </a:fld>
             <a:endParaRPr lang="en-US"/>
           </a:p>
@@ -3158,7 +3158,7 @@
           <a:p>
             <a:fld id="{E7EFD90C-36BD-A547-9E35-1F67BA9850CE}" type="datetimeFigureOut">
               <a:rPr lang="en-US" smtClean="0"/>
-              <a:t>21/2/11</a:t>
+              <a:t>21/6/26</a:t>
             </a:fld>
             <a:endParaRPr lang="en-US"/>
           </a:p>
@@ -3560,7 +3560,7 @@
                 <a:latin typeface="Arial"/>
                 <a:cs typeface="Arial"/>
               </a:rPr>
-              <a:t>a  Examine window of typed SNPs</a:t>
+              <a:t>(a)  Examine window of typed SNPs</a:t>
             </a:r>
             <a:endParaRPr lang="en-US" sz="2400" b="1" dirty="0">
               <a:latin typeface="Arial"/>
@@ -10114,7 +10114,7 @@
         <p:spPr>
           <a:xfrm>
             <a:off x="6869853" y="621610"/>
-            <a:ext cx="7135275" cy="461657"/>
+            <a:ext cx="7301987" cy="461657"/>
           </a:xfrm>
           <a:prstGeom prst="rect">
             <a:avLst/>
@@ -10128,18 +10128,11 @@
           <a:lstStyle/>
           <a:p>
             <a:r>
-              <a:rPr lang="en-US" sz="2400" b="1" dirty="0">
-                <a:latin typeface="Arial"/>
-                <a:cs typeface="Arial"/>
-              </a:rPr>
-              <a:t>b</a:t>
-            </a:r>
-            <a:r>
               <a:rPr lang="en-US" sz="2400" b="1" dirty="0" smtClean="0">
                 <a:latin typeface="Arial"/>
                 <a:cs typeface="Arial"/>
               </a:rPr>
-              <a:t>  Find </a:t>
+              <a:t>(b)  Find </a:t>
             </a:r>
             <a:r>
               <a:rPr lang="en-US" sz="2400" b="1" dirty="0">
@@ -10818,7 +10811,7 @@
       </p:pic>
       <p:pic>
         <p:nvPicPr>
-          <p:cNvPr id="55" name="Picture 54" descr="pmb_h_pmb_1_,_h_.pdf"/>
+          <p:cNvPr id="57" name="Picture 56" descr="h_4,_pmb_h_pmb_5.pdf"/>
           <p:cNvPicPr>
             <a:picLocks noChangeAspect="1"/>
           </p:cNvPicPr>
@@ -10826,66 +10819,6 @@
         </p:nvPicPr>
         <p:blipFill>
           <a:blip r:embed="rId10">
-            <a:extLst>
-              <a:ext uri="{28A0092B-C50C-407E-A947-70E740481C1C}">
-                <a14:useLocalDpi xmlns:a14="http://schemas.microsoft.com/office/drawing/2010/main" val="0"/>
-              </a:ext>
-            </a:extLst>
-          </a:blip>
-          <a:stretch>
-            <a:fillRect/>
-          </a:stretch>
-        </p:blipFill>
-        <p:spPr>
-          <a:xfrm>
-            <a:off x="1433064" y="6688370"/>
-            <a:ext cx="1251907" cy="304036"/>
-          </a:xfrm>
-          <a:prstGeom prst="rect">
-            <a:avLst/>
-          </a:prstGeom>
-        </p:spPr>
-      </p:pic>
-      <p:pic>
-        <p:nvPicPr>
-          <p:cNvPr id="56" name="Picture 55" descr="pmb_h_pmb_1_,_h_.pdf"/>
-          <p:cNvPicPr>
-            <a:picLocks noChangeAspect="1"/>
-          </p:cNvPicPr>
-          <p:nvPr/>
-        </p:nvPicPr>
-        <p:blipFill>
-          <a:blip r:embed="rId11">
-            <a:extLst>
-              <a:ext uri="{28A0092B-C50C-407E-A947-70E740481C1C}">
-                <a14:useLocalDpi xmlns:a14="http://schemas.microsoft.com/office/drawing/2010/main" val="0"/>
-              </a:ext>
-            </a:extLst>
-          </a:blip>
-          <a:stretch>
-            <a:fillRect/>
-          </a:stretch>
-        </p:blipFill>
-        <p:spPr>
-          <a:xfrm>
-            <a:off x="3320051" y="6707589"/>
-            <a:ext cx="1225074" cy="297517"/>
-          </a:xfrm>
-          <a:prstGeom prst="rect">
-            <a:avLst/>
-          </a:prstGeom>
-        </p:spPr>
-      </p:pic>
-      <p:pic>
-        <p:nvPicPr>
-          <p:cNvPr id="57" name="Picture 56" descr="h_4,_pmb_h_pmb_5.pdf"/>
-          <p:cNvPicPr>
-            <a:picLocks noChangeAspect="1"/>
-          </p:cNvPicPr>
-          <p:nvPr/>
-        </p:nvPicPr>
-        <p:blipFill>
-          <a:blip r:embed="rId12">
             <a:extLst>
               <a:ext uri="{28A0092B-C50C-407E-A947-70E740481C1C}">
                 <a14:useLocalDpi xmlns:a14="http://schemas.microsoft.com/office/drawing/2010/main" val="0"/>
@@ -11403,7 +11336,7 @@
           <p:nvPr/>
         </p:nvPicPr>
         <p:blipFill>
-          <a:blip r:embed="rId13">
+          <a:blip r:embed="rId11">
             <a:extLst>
               <a:ext uri="{28A0092B-C50C-407E-A947-70E740481C1C}">
                 <a14:useLocalDpi xmlns:a14="http://schemas.microsoft.com/office/drawing/2010/main" val="0"/>
@@ -11681,36 +11614,6 @@
       </p:sp>
       <p:pic>
         <p:nvPicPr>
-          <p:cNvPr id="65" name="Picture 64" descr="h_1.pdf"/>
-          <p:cNvPicPr>
-            <a:picLocks noChangeAspect="1"/>
-          </p:cNvPicPr>
-          <p:nvPr/>
-        </p:nvPicPr>
-        <p:blipFill>
-          <a:blip r:embed="rId14">
-            <a:extLst>
-              <a:ext uri="{28A0092B-C50C-407E-A947-70E740481C1C}">
-                <a14:useLocalDpi xmlns:a14="http://schemas.microsoft.com/office/drawing/2010/main" val="0"/>
-              </a:ext>
-            </a:extLst>
-          </a:blip>
-          <a:stretch>
-            <a:fillRect/>
-          </a:stretch>
-        </p:blipFill>
-        <p:spPr>
-          <a:xfrm>
-            <a:off x="5508525" y="6762571"/>
-            <a:ext cx="538349" cy="288681"/>
-          </a:xfrm>
-          <a:prstGeom prst="rect">
-            <a:avLst/>
-          </a:prstGeom>
-        </p:spPr>
-      </p:pic>
-      <p:pic>
-        <p:nvPicPr>
           <p:cNvPr id="66" name="Picture 65" descr="h_5.pdf"/>
           <p:cNvPicPr>
             <a:picLocks noChangeAspect="1"/>
@@ -11718,7 +11621,7 @@
           <p:nvPr/>
         </p:nvPicPr>
         <p:blipFill>
-          <a:blip r:embed="rId15">
+          <a:blip r:embed="rId12">
             <a:extLst>
               <a:ext uri="{28A0092B-C50C-407E-A947-70E740481C1C}">
                 <a14:useLocalDpi xmlns:a14="http://schemas.microsoft.com/office/drawing/2010/main" val="0"/>
@@ -11748,7 +11651,7 @@
           <p:nvPr/>
         </p:nvPicPr>
         <p:blipFill>
-          <a:blip r:embed="rId16">
+          <a:blip r:embed="rId13">
             <a:extLst>
               <a:ext uri="{28A0092B-C50C-407E-A947-70E740481C1C}">
                 <a14:useLocalDpi xmlns:a14="http://schemas.microsoft.com/office/drawing/2010/main" val="0"/>
@@ -11778,7 +11681,7 @@
           <p:nvPr/>
         </p:nvPicPr>
         <p:blipFill>
-          <a:blip r:embed="rId17">
+          <a:blip r:embed="rId14">
             <a:extLst>
               <a:ext uri="{28A0092B-C50C-407E-A947-70E740481C1C}">
                 <a14:useLocalDpi xmlns:a14="http://schemas.microsoft.com/office/drawing/2010/main" val="0"/>
@@ -11808,7 +11711,7 @@
           <p:nvPr/>
         </p:nvPicPr>
         <p:blipFill>
-          <a:blip r:embed="rId18">
+          <a:blip r:embed="rId15">
             <a:extLst>
               <a:ext uri="{28A0092B-C50C-407E-A947-70E740481C1C}">
                 <a14:useLocalDpi xmlns:a14="http://schemas.microsoft.com/office/drawing/2010/main" val="0"/>
@@ -11838,7 +11741,7 @@
         <p:spPr>
           <a:xfrm>
             <a:off x="781953" y="5405176"/>
-            <a:ext cx="5417908" cy="461657"/>
+            <a:ext cx="5537381" cy="461657"/>
           </a:xfrm>
           <a:prstGeom prst="rect">
             <a:avLst/>
@@ -11852,18 +11755,11 @@
           <a:lstStyle/>
           <a:p>
             <a:r>
-              <a:rPr lang="en-US" sz="2400" b="1" dirty="0">
-                <a:latin typeface="Arial"/>
-                <a:cs typeface="Arial"/>
-              </a:rPr>
-              <a:t>c</a:t>
-            </a:r>
-            <a:r>
               <a:rPr lang="en-US" sz="2400" b="1" dirty="0" smtClean="0">
                 <a:latin typeface="Arial"/>
                 <a:cs typeface="Arial"/>
               </a:rPr>
-              <a:t>  Connect </a:t>
+              <a:t>(c) Connect </a:t>
             </a:r>
             <a:r>
               <a:rPr lang="en-US" sz="2400" b="1" dirty="0">
@@ -11899,7 +11795,15 @@
           <a:p>
             <a:r>
               <a:rPr lang="en-US" sz="1800" dirty="0" smtClean="0"/>
-              <a:t>Parallel connection generates 2 surviving haplotypes:</a:t>
+              <a:t>Parallel connection generates </a:t>
+            </a:r>
+            <a:r>
+              <a:rPr lang="en-US" sz="1800" dirty="0" smtClean="0"/>
+              <a:t>3 </a:t>
+            </a:r>
+            <a:r>
+              <a:rPr lang="en-US" sz="1800" dirty="0" smtClean="0"/>
+              <a:t>surviving haplotypes:</a:t>
             </a:r>
             <a:endParaRPr lang="en-US" sz="1800" dirty="0"/>
           </a:p>
@@ -11996,7 +11900,7 @@
         </p:nvCxnSpPr>
         <p:spPr>
           <a:xfrm>
-            <a:off x="2812151" y="6844540"/>
+            <a:off x="2819286" y="6844540"/>
             <a:ext cx="303858" cy="0"/>
           </a:xfrm>
           <a:prstGeom prst="line">
@@ -12032,7 +11936,7 @@
         </p:nvCxnSpPr>
         <p:spPr>
           <a:xfrm>
-            <a:off x="2812151" y="7450000"/>
+            <a:off x="2819286" y="7450000"/>
             <a:ext cx="303858" cy="0"/>
           </a:xfrm>
           <a:prstGeom prst="line">
@@ -12875,7 +12779,7 @@
           <p:nvPr/>
         </p:nvPicPr>
         <p:blipFill>
-          <a:blip r:embed="rId10">
+          <a:blip r:embed="rId16">
             <a:extLst>
               <a:ext uri="{28A0092B-C50C-407E-A947-70E740481C1C}">
                 <a14:useLocalDpi xmlns:a14="http://schemas.microsoft.com/office/drawing/2010/main" val="0"/>
@@ -12905,7 +12809,7 @@
           <p:nvPr/>
         </p:nvPicPr>
         <p:blipFill>
-          <a:blip r:embed="rId11">
+          <a:blip r:embed="rId17">
             <a:extLst>
               <a:ext uri="{28A0092B-C50C-407E-A947-70E740481C1C}">
                 <a14:useLocalDpi xmlns:a14="http://schemas.microsoft.com/office/drawing/2010/main" val="0"/>
@@ -12935,7 +12839,7 @@
           <p:nvPr/>
         </p:nvPicPr>
         <p:blipFill>
-          <a:blip r:embed="rId19">
+          <a:blip r:embed="rId18">
             <a:extLst>
               <a:ext uri="{28A0092B-C50C-407E-A947-70E740481C1C}">
                 <a14:useLocalDpi xmlns:a14="http://schemas.microsoft.com/office/drawing/2010/main" val="0"/>
@@ -12965,7 +12869,7 @@
           <p:nvPr/>
         </p:nvPicPr>
         <p:blipFill>
-          <a:blip r:embed="rId20">
+          <a:blip r:embed="rId19">
             <a:extLst>
               <a:ext uri="{28A0092B-C50C-407E-A947-70E740481C1C}">
                 <a14:useLocalDpi xmlns:a14="http://schemas.microsoft.com/office/drawing/2010/main" val="0"/>
@@ -13538,7 +13442,7 @@
           <p:nvPr/>
         </p:nvPicPr>
         <p:blipFill>
-          <a:blip r:embed="rId21">
+          <a:blip r:embed="rId20">
             <a:extLst>
               <a:ext uri="{28A0092B-C50C-407E-A947-70E740481C1C}">
                 <a14:useLocalDpi xmlns:a14="http://schemas.microsoft.com/office/drawing/2010/main" val="0"/>
@@ -13568,7 +13472,7 @@
           <p:nvPr/>
         </p:nvPicPr>
         <p:blipFill>
-          <a:blip r:embed="rId22"/>
+          <a:blip r:embed="rId21"/>
           <a:stretch>
             <a:fillRect/>
           </a:stretch>
@@ -13592,7 +13496,7 @@
           <p:nvPr/>
         </p:nvPicPr>
         <p:blipFill>
-          <a:blip r:embed="rId22"/>
+          <a:blip r:embed="rId21"/>
           <a:stretch>
             <a:fillRect/>
           </a:stretch>
@@ -13616,7 +13520,7 @@
           <p:nvPr/>
         </p:nvPicPr>
         <p:blipFill>
-          <a:blip r:embed="rId23">
+          <a:blip r:embed="rId22">
             <a:extLst>
               <a:ext uri="{28A0092B-C50C-407E-A947-70E740481C1C}">
                 <a14:useLocalDpi xmlns:a14="http://schemas.microsoft.com/office/drawing/2010/main" val="0"/>
@@ -13646,7 +13550,7 @@
           <p:nvPr/>
         </p:nvPicPr>
         <p:blipFill>
-          <a:blip r:embed="rId24"/>
+          <a:blip r:embed="rId23"/>
           <a:stretch>
             <a:fillRect/>
           </a:stretch>
@@ -13670,7 +13574,7 @@
           <p:nvPr/>
         </p:nvPicPr>
         <p:blipFill>
-          <a:blip r:embed="rId24"/>
+          <a:blip r:embed="rId23"/>
           <a:stretch>
             <a:fillRect/>
           </a:stretch>
@@ -13694,7 +13598,7 @@
           <p:nvPr/>
         </p:nvPicPr>
         <p:blipFill>
-          <a:blip r:embed="rId24"/>
+          <a:blip r:embed="rId23"/>
           <a:stretch>
             <a:fillRect/>
           </a:stretch>
@@ -13801,7 +13705,7 @@
           <p:nvPr/>
         </p:nvPicPr>
         <p:blipFill>
-          <a:blip r:embed="rId12">
+          <a:blip r:embed="rId10">
             <a:extLst>
               <a:ext uri="{28A0092B-C50C-407E-A947-70E740481C1C}">
                 <a14:useLocalDpi xmlns:a14="http://schemas.microsoft.com/office/drawing/2010/main" val="0"/>
@@ -13919,18 +13823,11 @@
           <a:lstStyle/>
           <a:p>
             <a:r>
-              <a:rPr lang="en-US" sz="2400" b="1" dirty="0">
-                <a:latin typeface="Arial"/>
-                <a:cs typeface="Arial"/>
-              </a:rPr>
-              <a:t>d</a:t>
-            </a:r>
-            <a:r>
               <a:rPr lang="en-US" sz="2400" b="1" dirty="0" smtClean="0">
                 <a:latin typeface="Arial"/>
                 <a:cs typeface="Arial"/>
               </a:rPr>
-              <a:t>  Stitch </a:t>
+              <a:t>(d)  Stitch </a:t>
             </a:r>
             <a:r>
               <a:rPr lang="en-US" sz="2400" b="1" dirty="0">
@@ -13962,7 +13859,7 @@
           <p:nvPr/>
         </p:nvPicPr>
         <p:blipFill>
-          <a:blip r:embed="rId25"/>
+          <a:blip r:embed="rId24"/>
           <a:stretch>
             <a:fillRect/>
           </a:stretch>
@@ -14437,7 +14334,7 @@
           <p:nvPr/>
         </p:nvPicPr>
         <p:blipFill>
-          <a:blip r:embed="rId26">
+          <a:blip r:embed="rId25">
             <a:extLst>
               <a:ext uri="{28A0092B-C50C-407E-A947-70E740481C1C}">
                 <a14:useLocalDpi xmlns:a14="http://schemas.microsoft.com/office/drawing/2010/main" val="0"/>
@@ -14467,7 +14364,7 @@
           <p:nvPr/>
         </p:nvPicPr>
         <p:blipFill>
-          <a:blip r:embed="rId27">
+          <a:blip r:embed="rId26">
             <a:extLst>
               <a:ext uri="{28A0092B-C50C-407E-A947-70E740481C1C}">
                 <a14:useLocalDpi xmlns:a14="http://schemas.microsoft.com/office/drawing/2010/main" val="0"/>
@@ -14497,7 +14394,7 @@
           <p:nvPr/>
         </p:nvPicPr>
         <p:blipFill>
-          <a:blip r:embed="rId28">
+          <a:blip r:embed="rId27">
             <a:extLst>
               <a:ext uri="{28A0092B-C50C-407E-A947-70E740481C1C}">
                 <a14:useLocalDpi xmlns:a14="http://schemas.microsoft.com/office/drawing/2010/main" val="0"/>
@@ -14527,7 +14424,7 @@
           <p:nvPr/>
         </p:nvPicPr>
         <p:blipFill>
-          <a:blip r:embed="rId29">
+          <a:blip r:embed="rId28">
             <a:extLst>
               <a:ext uri="{28A0092B-C50C-407E-A947-70E740481C1C}">
                 <a14:useLocalDpi xmlns:a14="http://schemas.microsoft.com/office/drawing/2010/main" val="0"/>
@@ -14557,7 +14454,7 @@
           <p:nvPr/>
         </p:nvPicPr>
         <p:blipFill>
-          <a:blip r:embed="rId30">
+          <a:blip r:embed="rId29">
             <a:extLst>
               <a:ext uri="{28A0092B-C50C-407E-A947-70E740481C1C}">
                 <a14:useLocalDpi xmlns:a14="http://schemas.microsoft.com/office/drawing/2010/main" val="0"/>
@@ -14587,7 +14484,7 @@
           <p:nvPr/>
         </p:nvPicPr>
         <p:blipFill>
-          <a:blip r:embed="rId31">
+          <a:blip r:embed="rId30">
             <a:extLst>
               <a:ext uri="{28A0092B-C50C-407E-A947-70E740481C1C}">
                 <a14:useLocalDpi xmlns:a14="http://schemas.microsoft.com/office/drawing/2010/main" val="0"/>
@@ -14602,6 +14499,96 @@
           <a:xfrm>
             <a:off x="11022561" y="7310132"/>
             <a:ext cx="692409" cy="270596"/>
+          </a:xfrm>
+          <a:prstGeom prst="rect">
+            <a:avLst/>
+          </a:prstGeom>
+        </p:spPr>
+      </p:pic>
+      <p:pic>
+        <p:nvPicPr>
+          <p:cNvPr id="36" name="Picture 35" descr="pmb_h_1,_pmb_h_2.pdf"/>
+          <p:cNvPicPr>
+            <a:picLocks noChangeAspect="1"/>
+          </p:cNvPicPr>
+          <p:nvPr/>
+        </p:nvPicPr>
+        <p:blipFill>
+          <a:blip r:embed="rId31">
+            <a:extLst>
+              <a:ext uri="{28A0092B-C50C-407E-A947-70E740481C1C}">
+                <a14:useLocalDpi xmlns:a14="http://schemas.microsoft.com/office/drawing/2010/main" val="0"/>
+              </a:ext>
+            </a:extLst>
+          </a:blip>
+          <a:stretch>
+            <a:fillRect/>
+          </a:stretch>
+        </p:blipFill>
+        <p:spPr>
+          <a:xfrm>
+            <a:off x="1423821" y="6707589"/>
+            <a:ext cx="1200679" cy="291593"/>
+          </a:xfrm>
+          <a:prstGeom prst="rect">
+            <a:avLst/>
+          </a:prstGeom>
+        </p:spPr>
+      </p:pic>
+      <p:pic>
+        <p:nvPicPr>
+          <p:cNvPr id="37" name="Picture 36" descr="pmb_h_1,_pmb_h_2.pdf"/>
+          <p:cNvPicPr>
+            <a:picLocks noChangeAspect="1"/>
+          </p:cNvPicPr>
+          <p:nvPr/>
+        </p:nvPicPr>
+        <p:blipFill>
+          <a:blip r:embed="rId32">
+            <a:extLst>
+              <a:ext uri="{28A0092B-C50C-407E-A947-70E740481C1C}">
+                <a14:useLocalDpi xmlns:a14="http://schemas.microsoft.com/office/drawing/2010/main" val="0"/>
+              </a:ext>
+            </a:extLst>
+          </a:blip>
+          <a:stretch>
+            <a:fillRect/>
+          </a:stretch>
+        </p:blipFill>
+        <p:spPr>
+          <a:xfrm>
+            <a:off x="3326051" y="6703978"/>
+            <a:ext cx="1215546" cy="295204"/>
+          </a:xfrm>
+          <a:prstGeom prst="rect">
+            <a:avLst/>
+          </a:prstGeom>
+        </p:spPr>
+      </p:pic>
+      <p:pic>
+        <p:nvPicPr>
+          <p:cNvPr id="41" name="Picture 40" descr="h_1,_h_2.pdf"/>
+          <p:cNvPicPr>
+            <a:picLocks noChangeAspect="1"/>
+          </p:cNvPicPr>
+          <p:nvPr/>
+        </p:nvPicPr>
+        <p:blipFill>
+          <a:blip r:embed="rId33">
+            <a:extLst>
+              <a:ext uri="{28A0092B-C50C-407E-A947-70E740481C1C}">
+                <a14:useLocalDpi xmlns:a14="http://schemas.microsoft.com/office/drawing/2010/main" val="0"/>
+              </a:ext>
+            </a:extLst>
+          </a:blip>
+          <a:stretch>
+            <a:fillRect/>
+          </a:stretch>
+        </p:blipFill>
+        <p:spPr>
+          <a:xfrm>
+            <a:off x="5269535" y="6718041"/>
+            <a:ext cx="1027578" cy="314219"/>
           </a:xfrm>
           <a:prstGeom prst="rect">
             <a:avLst/>

</xml_diff>